<commit_message>
Resized and adjusted figures up to Ch. 3. Worked on Ch.1 and Ch.2
</commit_message>
<xml_diff>
--- a/Images/Chapter3/FrontalSlice/FrontalSlice.pptx
+++ b/Images/Chapter3/FrontalSlice/FrontalSlice.pptx
@@ -7,7 +7,7 @@
   <p:sldIdLst>
     <p:sldId id="256" r:id="rId2"/>
   </p:sldIdLst>
-  <p:sldSz cx="7315200" cy="5486400"/>
+  <p:sldSz cx="7315200" cy="5486400" type="B5JIS"/>
   <p:notesSz cx="6858000" cy="9144000"/>
   <p:defaultTextStyle>
     <a:defPPr>
@@ -254,7 +254,7 @@
           <a:p>
             <a:fld id="{2CBEEEF6-6322-41F3-BA34-C8F4C57A89C3}" type="datetimeFigureOut">
               <a:rPr lang="en-US" smtClean="0"/>
-              <a:t>6/15/2015</a:t>
+              <a:t>9/23/2015</a:t>
             </a:fld>
             <a:endParaRPr lang="en-US"/>
           </a:p>
@@ -424,7 +424,7 @@
           <a:p>
             <a:fld id="{2CBEEEF6-6322-41F3-BA34-C8F4C57A89C3}" type="datetimeFigureOut">
               <a:rPr lang="en-US" smtClean="0"/>
-              <a:t>6/15/2015</a:t>
+              <a:t>9/23/2015</a:t>
             </a:fld>
             <a:endParaRPr lang="en-US"/>
           </a:p>
@@ -604,7 +604,7 @@
           <a:p>
             <a:fld id="{2CBEEEF6-6322-41F3-BA34-C8F4C57A89C3}" type="datetimeFigureOut">
               <a:rPr lang="en-US" smtClean="0"/>
-              <a:t>6/15/2015</a:t>
+              <a:t>9/23/2015</a:t>
             </a:fld>
             <a:endParaRPr lang="en-US"/>
           </a:p>
@@ -774,7 +774,7 @@
           <a:p>
             <a:fld id="{2CBEEEF6-6322-41F3-BA34-C8F4C57A89C3}" type="datetimeFigureOut">
               <a:rPr lang="en-US" smtClean="0"/>
-              <a:t>6/15/2015</a:t>
+              <a:t>9/23/2015</a:t>
             </a:fld>
             <a:endParaRPr lang="en-US"/>
           </a:p>
@@ -1018,7 +1018,7 @@
           <a:p>
             <a:fld id="{2CBEEEF6-6322-41F3-BA34-C8F4C57A89C3}" type="datetimeFigureOut">
               <a:rPr lang="en-US" smtClean="0"/>
-              <a:t>6/15/2015</a:t>
+              <a:t>9/23/2015</a:t>
             </a:fld>
             <a:endParaRPr lang="en-US"/>
           </a:p>
@@ -1250,7 +1250,7 @@
           <a:p>
             <a:fld id="{2CBEEEF6-6322-41F3-BA34-C8F4C57A89C3}" type="datetimeFigureOut">
               <a:rPr lang="en-US" smtClean="0"/>
-              <a:t>6/15/2015</a:t>
+              <a:t>9/23/2015</a:t>
             </a:fld>
             <a:endParaRPr lang="en-US"/>
           </a:p>
@@ -1617,7 +1617,7 @@
           <a:p>
             <a:fld id="{2CBEEEF6-6322-41F3-BA34-C8F4C57A89C3}" type="datetimeFigureOut">
               <a:rPr lang="en-US" smtClean="0"/>
-              <a:t>6/15/2015</a:t>
+              <a:t>9/23/2015</a:t>
             </a:fld>
             <a:endParaRPr lang="en-US"/>
           </a:p>
@@ -1735,7 +1735,7 @@
           <a:p>
             <a:fld id="{2CBEEEF6-6322-41F3-BA34-C8F4C57A89C3}" type="datetimeFigureOut">
               <a:rPr lang="en-US" smtClean="0"/>
-              <a:t>6/15/2015</a:t>
+              <a:t>9/23/2015</a:t>
             </a:fld>
             <a:endParaRPr lang="en-US"/>
           </a:p>
@@ -1830,7 +1830,7 @@
           <a:p>
             <a:fld id="{2CBEEEF6-6322-41F3-BA34-C8F4C57A89C3}" type="datetimeFigureOut">
               <a:rPr lang="en-US" smtClean="0"/>
-              <a:t>6/15/2015</a:t>
+              <a:t>9/23/2015</a:t>
             </a:fld>
             <a:endParaRPr lang="en-US"/>
           </a:p>
@@ -2107,7 +2107,7 @@
           <a:p>
             <a:fld id="{2CBEEEF6-6322-41F3-BA34-C8F4C57A89C3}" type="datetimeFigureOut">
               <a:rPr lang="en-US" smtClean="0"/>
-              <a:t>6/15/2015</a:t>
+              <a:t>9/23/2015</a:t>
             </a:fld>
             <a:endParaRPr lang="en-US"/>
           </a:p>
@@ -2364,7 +2364,7 @@
           <a:p>
             <a:fld id="{2CBEEEF6-6322-41F3-BA34-C8F4C57A89C3}" type="datetimeFigureOut">
               <a:rPr lang="en-US" smtClean="0"/>
-              <a:t>6/15/2015</a:t>
+              <a:t>9/23/2015</a:t>
             </a:fld>
             <a:endParaRPr lang="en-US"/>
           </a:p>
@@ -2577,7 +2577,7 @@
           <a:p>
             <a:fld id="{2CBEEEF6-6322-41F3-BA34-C8F4C57A89C3}" type="datetimeFigureOut">
               <a:rPr lang="en-US" smtClean="0"/>
-              <a:t>6/15/2015</a:t>
+              <a:t>9/23/2015</a:t>
             </a:fld>
             <a:endParaRPr lang="en-US"/>
           </a:p>
@@ -3100,8 +3100,8 @@
           </p:txBody>
         </p:sp>
       </p:grpSp>
-      <mc:AlternateContent xmlns:mc="http://schemas.openxmlformats.org/markup-compatibility/2006">
-        <mc:Choice xmlns:a14="http://schemas.microsoft.com/office/drawing/2010/main" Requires="a14">
+      <mc:AlternateContent xmlns:mc="http://schemas.openxmlformats.org/markup-compatibility/2006" xmlns:a14="http://schemas.microsoft.com/office/drawing/2010/main">
+        <mc:Choice Requires="a14">
           <p:sp>
             <p:nvSpPr>
               <p:cNvPr id="4" name="Rectangle 3"/>
@@ -3174,7 +3174,7 @@
             </p:txBody>
           </p:sp>
         </mc:Choice>
-        <mc:Fallback>
+        <mc:Fallback xmlns="">
           <p:sp>
             <p:nvSpPr>
               <p:cNvPr id="4" name="Rectangle 3"/>
@@ -3238,13 +3238,11 @@
             <a:pPr algn="ctr"/>
             <a:r>
               <a:rPr lang="en-US" sz="3000" dirty="0">
-                <a:latin typeface="Source Sans Pro" panose="020B0503030403020204" pitchFamily="34" charset="0"/>
+                <a:latin typeface="Times New Roman" panose="02020603050405020304" pitchFamily="18" charset="0"/>
+                <a:cs typeface="Times New Roman" panose="02020603050405020304" pitchFamily="18" charset="0"/>
               </a:rPr>
               <a:t>S</a:t>
             </a:r>
-            <a:endParaRPr lang="en-US" sz="3000" dirty="0">
-              <a:latin typeface="Source Sans Pro" panose="020B0503030403020204" pitchFamily="34" charset="0"/>
-            </a:endParaRPr>
           </a:p>
         </p:txBody>
       </p:sp>
@@ -3273,13 +3271,11 @@
             <a:pPr algn="ctr"/>
             <a:r>
               <a:rPr lang="en-US" sz="3000" dirty="0">
-                <a:latin typeface="Source Sans Pro" panose="020B0503030403020204" pitchFamily="34" charset="0"/>
+                <a:latin typeface="Times New Roman" panose="02020603050405020304" pitchFamily="18" charset="0"/>
+                <a:cs typeface="Times New Roman" panose="02020603050405020304" pitchFamily="18" charset="0"/>
               </a:rPr>
               <a:t>I</a:t>
             </a:r>
-            <a:endParaRPr lang="en-US" sz="3000" dirty="0">
-              <a:latin typeface="Source Sans Pro" panose="020B0503030403020204" pitchFamily="34" charset="0"/>
-            </a:endParaRPr>
           </a:p>
         </p:txBody>
       </p:sp>
@@ -3308,13 +3304,11 @@
             <a:pPr algn="ctr"/>
             <a:r>
               <a:rPr lang="en-US" sz="3000" dirty="0">
-                <a:latin typeface="Source Sans Pro" panose="020B0503030403020204" pitchFamily="34" charset="0"/>
+                <a:latin typeface="Times New Roman" panose="02020603050405020304" pitchFamily="18" charset="0"/>
+                <a:cs typeface="Times New Roman" panose="02020603050405020304" pitchFamily="18" charset="0"/>
               </a:rPr>
               <a:t>L</a:t>
             </a:r>
-            <a:endParaRPr lang="en-US" sz="3000" dirty="0">
-              <a:latin typeface="Source Sans Pro" panose="020B0503030403020204" pitchFamily="34" charset="0"/>
-            </a:endParaRPr>
           </a:p>
         </p:txBody>
       </p:sp>
@@ -3343,13 +3337,11 @@
             <a:pPr algn="ctr"/>
             <a:r>
               <a:rPr lang="en-US" sz="3000" dirty="0">
-                <a:latin typeface="Source Sans Pro" panose="020B0503030403020204" pitchFamily="34" charset="0"/>
+                <a:latin typeface="Times New Roman" panose="02020603050405020304" pitchFamily="18" charset="0"/>
+                <a:cs typeface="Times New Roman" panose="02020603050405020304" pitchFamily="18" charset="0"/>
               </a:rPr>
               <a:t>R</a:t>
             </a:r>
-            <a:endParaRPr lang="en-US" sz="3000" dirty="0">
-              <a:latin typeface="Source Sans Pro" panose="020B0503030403020204" pitchFamily="34" charset="0"/>
-            </a:endParaRPr>
           </a:p>
         </p:txBody>
       </p:sp>
@@ -3385,8 +3377,8 @@
               <a:solidFill>
                 <a:schemeClr val="tx1"/>
               </a:solidFill>
-              <a:headEnd type="triangle" w="sm" len="sm"/>
-              <a:tailEnd type="triangle" w="sm" len="sm"/>
+              <a:headEnd type="triangle" w="med" len="med"/>
+              <a:tailEnd type="triangle" w="med" len="med"/>
             </a:ln>
           </p:spPr>
           <p:style>
@@ -3422,8 +3414,8 @@
               <a:solidFill>
                 <a:schemeClr val="tx1"/>
               </a:solidFill>
-              <a:headEnd type="triangle" w="sm" len="sm"/>
-              <a:tailEnd type="triangle" w="sm" len="sm"/>
+              <a:headEnd type="triangle" w="med" len="med"/>
+              <a:tailEnd type="triangle" w="med" len="med"/>
             </a:ln>
           </p:spPr>
           <p:style>
@@ -3461,7 +3453,7 @@
               <a:schemeClr val="tx1"/>
             </a:solidFill>
             <a:headEnd type="none" w="med" len="med"/>
-            <a:tailEnd type="triangle" w="med" len="med"/>
+            <a:tailEnd type="triangle" w="lg" len="lg"/>
           </a:ln>
         </p:spPr>
         <p:style>
@@ -3504,13 +3496,11 @@
             <a:pPr algn="ctr"/>
             <a:r>
               <a:rPr lang="en-US" sz="2540" dirty="0">
-                <a:latin typeface="Source Sans Pro" panose="020B0503030403020204" pitchFamily="34" charset="0"/>
+                <a:latin typeface="Times New Roman" panose="02020603050405020304" pitchFamily="18" charset="0"/>
+                <a:cs typeface="Times New Roman" panose="02020603050405020304" pitchFamily="18" charset="0"/>
               </a:rPr>
               <a:t>unreachable regions</a:t>
             </a:r>
-            <a:endParaRPr lang="en-US" sz="2540" dirty="0">
-              <a:latin typeface="Source Sans Pro" panose="020B0503030403020204" pitchFamily="34" charset="0"/>
-            </a:endParaRPr>
           </a:p>
         </p:txBody>
       </p:sp>
@@ -3539,13 +3529,11 @@
             <a:pPr algn="ctr"/>
             <a:r>
               <a:rPr lang="en-US" sz="2540" dirty="0">
-                <a:latin typeface="Source Sans Pro" panose="020B0503030403020204" pitchFamily="34" charset="0"/>
+                <a:latin typeface="Times New Roman" panose="02020603050405020304" pitchFamily="18" charset="0"/>
+                <a:cs typeface="Times New Roman" panose="02020603050405020304" pitchFamily="18" charset="0"/>
               </a:rPr>
               <a:t>vessels</a:t>
             </a:r>
-            <a:endParaRPr lang="en-US" sz="2540" dirty="0">
-              <a:latin typeface="Source Sans Pro" panose="020B0503030403020204" pitchFamily="34" charset="0"/>
-            </a:endParaRPr>
           </a:p>
         </p:txBody>
       </p:sp>
@@ -3723,19 +3711,18 @@
           <a:p>
             <a:r>
               <a:rPr lang="en-US" sz="2400" dirty="0" smtClean="0">
-                <a:latin typeface="Source Sans Pro" panose="020B0503030403020204" pitchFamily="34" charset="0"/>
+                <a:latin typeface="Times New Roman" panose="02020603050405020304" pitchFamily="18" charset="0"/>
+                <a:cs typeface="Times New Roman" panose="02020603050405020304" pitchFamily="18" charset="0"/>
               </a:rPr>
               <a:t>&gt; 200 </a:t>
             </a:r>
             <a:r>
               <a:rPr lang="en-US" sz="2400" dirty="0">
-                <a:latin typeface="Source Sans Pro" panose="020B0503030403020204" pitchFamily="34" charset="0"/>
+                <a:latin typeface="Times New Roman" panose="02020603050405020304" pitchFamily="18" charset="0"/>
+                <a:cs typeface="Times New Roman" panose="02020603050405020304" pitchFamily="18" charset="0"/>
               </a:rPr>
               <a:t>mm</a:t>
             </a:r>
-            <a:endParaRPr lang="en-US" sz="2400" dirty="0">
-              <a:latin typeface="Source Sans Pro" panose="020B0503030403020204" pitchFamily="34" charset="0"/>
-            </a:endParaRPr>
           </a:p>
         </p:txBody>
       </p:sp>
@@ -3765,12 +3752,14 @@
           <a:p>
             <a:r>
               <a:rPr lang="en-US" sz="2400" dirty="0" smtClean="0">
-                <a:latin typeface="Source Sans Pro" panose="020B0503030403020204" pitchFamily="34" charset="0"/>
+                <a:latin typeface="Times New Roman" panose="02020603050405020304" pitchFamily="18" charset="0"/>
+                <a:cs typeface="Times New Roman" panose="02020603050405020304" pitchFamily="18" charset="0"/>
               </a:rPr>
               <a:t>150 mm</a:t>
             </a:r>
             <a:endParaRPr lang="en-US" sz="2400" dirty="0">
-              <a:latin typeface="Source Sans Pro" panose="020B0503030403020204" pitchFamily="34" charset="0"/>
+              <a:latin typeface="Times New Roman" panose="02020603050405020304" pitchFamily="18" charset="0"/>
+              <a:cs typeface="Times New Roman" panose="02020603050405020304" pitchFamily="18" charset="0"/>
             </a:endParaRPr>
           </a:p>
         </p:txBody>
@@ -3801,12 +3790,14 @@
           <a:p>
             <a:r>
               <a:rPr lang="en-US" sz="2400" dirty="0" smtClean="0">
-                <a:latin typeface="Source Sans Pro" panose="020B0503030403020204" pitchFamily="34" charset="0"/>
+                <a:latin typeface="Times New Roman" panose="02020603050405020304" pitchFamily="18" charset="0"/>
+                <a:cs typeface="Times New Roman" panose="02020603050405020304" pitchFamily="18" charset="0"/>
               </a:rPr>
               <a:t>100 mm</a:t>
             </a:r>
             <a:endParaRPr lang="en-US" sz="2400" dirty="0">
-              <a:latin typeface="Source Sans Pro" panose="020B0503030403020204" pitchFamily="34" charset="0"/>
+              <a:latin typeface="Times New Roman" panose="02020603050405020304" pitchFamily="18" charset="0"/>
+              <a:cs typeface="Times New Roman" panose="02020603050405020304" pitchFamily="18" charset="0"/>
             </a:endParaRPr>
           </a:p>
         </p:txBody>
@@ -3840,18 +3831,21 @@
                 <a:solidFill>
                   <a:schemeClr val="bg1"/>
                 </a:solidFill>
-                <a:latin typeface="Source Sans Pro" panose="020B0503030403020204" pitchFamily="34" charset="0"/>
+                <a:latin typeface="Times New Roman" panose="02020603050405020304" pitchFamily="18" charset="0"/>
+                <a:cs typeface="Times New Roman" panose="02020603050405020304" pitchFamily="18" charset="0"/>
               </a:rPr>
               <a:t>1</a:t>
             </a:r>
             <a:r>
               <a:rPr lang="en-US" sz="2400" dirty="0" smtClean="0">
-                <a:latin typeface="Source Sans Pro" panose="020B0503030403020204" pitchFamily="34" charset="0"/>
+                <a:latin typeface="Times New Roman" panose="02020603050405020304" pitchFamily="18" charset="0"/>
+                <a:cs typeface="Times New Roman" panose="02020603050405020304" pitchFamily="18" charset="0"/>
               </a:rPr>
               <a:t>50 mm</a:t>
             </a:r>
             <a:endParaRPr lang="en-US" sz="2400" dirty="0">
-              <a:latin typeface="Source Sans Pro" panose="020B0503030403020204" pitchFamily="34" charset="0"/>
+              <a:latin typeface="Times New Roman" panose="02020603050405020304" pitchFamily="18" charset="0"/>
+              <a:cs typeface="Times New Roman" panose="02020603050405020304" pitchFamily="18" charset="0"/>
             </a:endParaRPr>
           </a:p>
         </p:txBody>

</xml_diff>